<commit_message>
Notes added to docs\misc\DESTangles
</commit_message>
<xml_diff>
--- a/docs/misc/DESTangles.pptx
+++ b/docs/misc/DESTangles.pptx
@@ -6,6 +6,10 @@
   </p:sldMasterIdLst>
   <p:sldIdLst>
     <p:sldId id="256" r:id="rId2"/>
+    <p:sldId id="257" r:id="rId3"/>
+    <p:sldId id="258" r:id="rId4"/>
+    <p:sldId id="259" r:id="rId5"/>
+    <p:sldId id="261" r:id="rId6"/>
   </p:sldIdLst>
   <p:sldSz cx="12192000" cy="6858000"/>
   <p:notesSz cx="6858000" cy="9144000"/>
@@ -243,7 +247,7 @@
           <a:p>
             <a:fld id="{EFE5E818-53A5-4017-9DB5-8CFA9A1E4433}" type="datetimeFigureOut">
               <a:rPr lang="en-US" smtClean="0"/>
-              <a:t>6/26/2018</a:t>
+              <a:t>5/1/2019</a:t>
             </a:fld>
             <a:endParaRPr lang="en-US"/>
           </a:p>
@@ -413,7 +417,7 @@
           <a:p>
             <a:fld id="{EFE5E818-53A5-4017-9DB5-8CFA9A1E4433}" type="datetimeFigureOut">
               <a:rPr lang="en-US" smtClean="0"/>
-              <a:t>6/26/2018</a:t>
+              <a:t>5/1/2019</a:t>
             </a:fld>
             <a:endParaRPr lang="en-US"/>
           </a:p>
@@ -593,7 +597,7 @@
           <a:p>
             <a:fld id="{EFE5E818-53A5-4017-9DB5-8CFA9A1E4433}" type="datetimeFigureOut">
               <a:rPr lang="en-US" smtClean="0"/>
-              <a:t>6/26/2018</a:t>
+              <a:t>5/1/2019</a:t>
             </a:fld>
             <a:endParaRPr lang="en-US"/>
           </a:p>
@@ -763,7 +767,7 @@
           <a:p>
             <a:fld id="{EFE5E818-53A5-4017-9DB5-8CFA9A1E4433}" type="datetimeFigureOut">
               <a:rPr lang="en-US" smtClean="0"/>
-              <a:t>6/26/2018</a:t>
+              <a:t>5/1/2019</a:t>
             </a:fld>
             <a:endParaRPr lang="en-US"/>
           </a:p>
@@ -1009,7 +1013,7 @@
           <a:p>
             <a:fld id="{EFE5E818-53A5-4017-9DB5-8CFA9A1E4433}" type="datetimeFigureOut">
               <a:rPr lang="en-US" smtClean="0"/>
-              <a:t>6/26/2018</a:t>
+              <a:t>5/1/2019</a:t>
             </a:fld>
             <a:endParaRPr lang="en-US"/>
           </a:p>
@@ -1241,7 +1245,7 @@
           <a:p>
             <a:fld id="{EFE5E818-53A5-4017-9DB5-8CFA9A1E4433}" type="datetimeFigureOut">
               <a:rPr lang="en-US" smtClean="0"/>
-              <a:t>6/26/2018</a:t>
+              <a:t>5/1/2019</a:t>
             </a:fld>
             <a:endParaRPr lang="en-US"/>
           </a:p>
@@ -1608,7 +1612,7 @@
           <a:p>
             <a:fld id="{EFE5E818-53A5-4017-9DB5-8CFA9A1E4433}" type="datetimeFigureOut">
               <a:rPr lang="en-US" smtClean="0"/>
-              <a:t>6/26/2018</a:t>
+              <a:t>5/1/2019</a:t>
             </a:fld>
             <a:endParaRPr lang="en-US"/>
           </a:p>
@@ -1726,7 +1730,7 @@
           <a:p>
             <a:fld id="{EFE5E818-53A5-4017-9DB5-8CFA9A1E4433}" type="datetimeFigureOut">
               <a:rPr lang="en-US" smtClean="0"/>
-              <a:t>6/26/2018</a:t>
+              <a:t>5/1/2019</a:t>
             </a:fld>
             <a:endParaRPr lang="en-US"/>
           </a:p>
@@ -1821,7 +1825,7 @@
           <a:p>
             <a:fld id="{EFE5E818-53A5-4017-9DB5-8CFA9A1E4433}" type="datetimeFigureOut">
               <a:rPr lang="en-US" smtClean="0"/>
-              <a:t>6/26/2018</a:t>
+              <a:t>5/1/2019</a:t>
             </a:fld>
             <a:endParaRPr lang="en-US"/>
           </a:p>
@@ -2098,7 +2102,7 @@
           <a:p>
             <a:fld id="{EFE5E818-53A5-4017-9DB5-8CFA9A1E4433}" type="datetimeFigureOut">
               <a:rPr lang="en-US" smtClean="0"/>
-              <a:t>6/26/2018</a:t>
+              <a:t>5/1/2019</a:t>
             </a:fld>
             <a:endParaRPr lang="en-US"/>
           </a:p>
@@ -2351,7 +2355,7 @@
           <a:p>
             <a:fld id="{EFE5E818-53A5-4017-9DB5-8CFA9A1E4433}" type="datetimeFigureOut">
               <a:rPr lang="en-US" smtClean="0"/>
-              <a:t>6/26/2018</a:t>
+              <a:t>5/1/2019</a:t>
             </a:fld>
             <a:endParaRPr lang="en-US"/>
           </a:p>
@@ -2564,7 +2568,7 @@
           <a:p>
             <a:fld id="{EFE5E818-53A5-4017-9DB5-8CFA9A1E4433}" type="datetimeFigureOut">
               <a:rPr lang="en-US" smtClean="0"/>
-              <a:t>6/26/2018</a:t>
+              <a:t>5/1/2019</a:t>
             </a:fld>
             <a:endParaRPr lang="en-US"/>
           </a:p>
@@ -4947,8 +4951,8 @@
           </a:fontRef>
         </p:style>
       </p:cxnSp>
-      <mc:AlternateContent xmlns:mc="http://schemas.openxmlformats.org/markup-compatibility/2006">
-        <mc:Choice xmlns:a14="http://schemas.microsoft.com/office/drawing/2010/main" Requires="a14">
+      <mc:AlternateContent xmlns:mc="http://schemas.openxmlformats.org/markup-compatibility/2006" xmlns:a14="http://schemas.microsoft.com/office/drawing/2010/main">
+        <mc:Choice Requires="a14">
           <p:sp>
             <p:nvSpPr>
               <p:cNvPr id="43" name="TextBox 42"/>
@@ -5024,7 +5028,7 @@
             </p:txBody>
           </p:sp>
         </mc:Choice>
-        <mc:Fallback>
+        <mc:Fallback xmlns="">
           <p:sp>
             <p:nvSpPr>
               <p:cNvPr id="43" name="TextBox 42"/>
@@ -5063,8 +5067,8 @@
           </p:sp>
         </mc:Fallback>
       </mc:AlternateContent>
-      <mc:AlternateContent xmlns:mc="http://schemas.openxmlformats.org/markup-compatibility/2006">
-        <mc:Choice xmlns:a14="http://schemas.microsoft.com/office/drawing/2010/main" Requires="a14">
+      <mc:AlternateContent xmlns:mc="http://schemas.openxmlformats.org/markup-compatibility/2006" xmlns:a14="http://schemas.microsoft.com/office/drawing/2010/main">
+        <mc:Choice Requires="a14">
           <p:sp>
             <p:nvSpPr>
               <p:cNvPr id="44" name="TextBox 43"/>
@@ -5140,7 +5144,7 @@
             </p:txBody>
           </p:sp>
         </mc:Choice>
-        <mc:Fallback>
+        <mc:Fallback xmlns="">
           <p:sp>
             <p:nvSpPr>
               <p:cNvPr id="44" name="TextBox 43"/>
@@ -5179,8 +5183,8 @@
           </p:sp>
         </mc:Fallback>
       </mc:AlternateContent>
-      <mc:AlternateContent xmlns:mc="http://schemas.openxmlformats.org/markup-compatibility/2006">
-        <mc:Choice xmlns:a14="http://schemas.microsoft.com/office/drawing/2010/main" Requires="a14">
+      <mc:AlternateContent xmlns:mc="http://schemas.openxmlformats.org/markup-compatibility/2006" xmlns:a14="http://schemas.microsoft.com/office/drawing/2010/main">
+        <mc:Choice Requires="a14">
           <p:sp>
             <p:nvSpPr>
               <p:cNvPr id="47" name="TextBox 46"/>
@@ -5256,7 +5260,7 @@
             </p:txBody>
           </p:sp>
         </mc:Choice>
-        <mc:Fallback>
+        <mc:Fallback xmlns="">
           <p:sp>
             <p:nvSpPr>
               <p:cNvPr id="47" name="TextBox 46"/>
@@ -5295,8 +5299,8 @@
           </p:sp>
         </mc:Fallback>
       </mc:AlternateContent>
-      <mc:AlternateContent xmlns:mc="http://schemas.openxmlformats.org/markup-compatibility/2006">
-        <mc:Choice xmlns:a14="http://schemas.microsoft.com/office/drawing/2010/main" Requires="a14">
+      <mc:AlternateContent xmlns:mc="http://schemas.openxmlformats.org/markup-compatibility/2006" xmlns:a14="http://schemas.microsoft.com/office/drawing/2010/main">
+        <mc:Choice Requires="a14">
           <p:sp>
             <p:nvSpPr>
               <p:cNvPr id="49" name="TextBox 48"/>
@@ -5380,7 +5384,7 @@
             </p:txBody>
           </p:sp>
         </mc:Choice>
-        <mc:Fallback>
+        <mc:Fallback xmlns="">
           <p:sp>
             <p:nvSpPr>
               <p:cNvPr id="49" name="TextBox 48"/>
@@ -5419,8 +5423,8 @@
           </p:sp>
         </mc:Fallback>
       </mc:AlternateContent>
-      <mc:AlternateContent xmlns:mc="http://schemas.openxmlformats.org/markup-compatibility/2006">
-        <mc:Choice xmlns:a14="http://schemas.microsoft.com/office/drawing/2010/main" Requires="a14">
+      <mc:AlternateContent xmlns:mc="http://schemas.openxmlformats.org/markup-compatibility/2006" xmlns:a14="http://schemas.microsoft.com/office/drawing/2010/main">
+        <mc:Choice Requires="a14">
           <p:sp>
             <p:nvSpPr>
               <p:cNvPr id="50" name="Rectangle 49"/>
@@ -5912,7 +5916,7 @@
             </p:txBody>
           </p:sp>
         </mc:Choice>
-        <mc:Fallback>
+        <mc:Fallback xmlns="">
           <p:sp>
             <p:nvSpPr>
               <p:cNvPr id="50" name="Rectangle 49"/>
@@ -5951,8 +5955,8 @@
           </p:sp>
         </mc:Fallback>
       </mc:AlternateContent>
-      <mc:AlternateContent xmlns:mc="http://schemas.openxmlformats.org/markup-compatibility/2006">
-        <mc:Choice xmlns:a14="http://schemas.microsoft.com/office/drawing/2010/main" Requires="a14">
+      <mc:AlternateContent xmlns:mc="http://schemas.openxmlformats.org/markup-compatibility/2006" xmlns:a14="http://schemas.microsoft.com/office/drawing/2010/main">
+        <mc:Choice Requires="a14">
           <p:sp>
             <p:nvSpPr>
               <p:cNvPr id="51" name="TextBox 50"/>
@@ -6003,7 +6007,7 @@
             </p:txBody>
           </p:sp>
         </mc:Choice>
-        <mc:Fallback>
+        <mc:Fallback xmlns="">
           <p:sp>
             <p:nvSpPr>
               <p:cNvPr id="51" name="TextBox 50"/>
@@ -6042,8 +6046,8 @@
           </p:sp>
         </mc:Fallback>
       </mc:AlternateContent>
-      <mc:AlternateContent xmlns:mc="http://schemas.openxmlformats.org/markup-compatibility/2006">
-        <mc:Choice xmlns:a14="http://schemas.microsoft.com/office/drawing/2010/main" Requires="a14">
+      <mc:AlternateContent xmlns:mc="http://schemas.openxmlformats.org/markup-compatibility/2006" xmlns:a14="http://schemas.microsoft.com/office/drawing/2010/main">
+        <mc:Choice Requires="a14">
           <p:sp>
             <p:nvSpPr>
               <p:cNvPr id="52" name="TextBox 51"/>
@@ -6119,7 +6123,7 @@
             </p:txBody>
           </p:sp>
         </mc:Choice>
-        <mc:Fallback>
+        <mc:Fallback xmlns="">
           <p:sp>
             <p:nvSpPr>
               <p:cNvPr id="52" name="TextBox 51"/>
@@ -6158,8 +6162,8 @@
           </p:sp>
         </mc:Fallback>
       </mc:AlternateContent>
-      <mc:AlternateContent xmlns:mc="http://schemas.openxmlformats.org/markup-compatibility/2006">
-        <mc:Choice xmlns:a14="http://schemas.microsoft.com/office/drawing/2010/main" Requires="a14">
+      <mc:AlternateContent xmlns:mc="http://schemas.openxmlformats.org/markup-compatibility/2006" xmlns:a14="http://schemas.microsoft.com/office/drawing/2010/main">
+        <mc:Choice Requires="a14">
           <p:sp>
             <p:nvSpPr>
               <p:cNvPr id="53" name="TextBox 52"/>
@@ -6235,7 +6239,7 @@
             </p:txBody>
           </p:sp>
         </mc:Choice>
-        <mc:Fallback>
+        <mc:Fallback xmlns="">
           <p:sp>
             <p:nvSpPr>
               <p:cNvPr id="53" name="TextBox 52"/>
@@ -6274,8 +6278,8 @@
           </p:sp>
         </mc:Fallback>
       </mc:AlternateContent>
-      <mc:AlternateContent xmlns:mc="http://schemas.openxmlformats.org/markup-compatibility/2006">
-        <mc:Choice xmlns:a14="http://schemas.microsoft.com/office/drawing/2010/main" Requires="a14">
+      <mc:AlternateContent xmlns:mc="http://schemas.openxmlformats.org/markup-compatibility/2006" xmlns:a14="http://schemas.microsoft.com/office/drawing/2010/main">
+        <mc:Choice Requires="a14">
           <p:sp>
             <p:nvSpPr>
               <p:cNvPr id="54" name="Rectangle 53"/>
@@ -6699,7 +6703,7 @@
             </p:txBody>
           </p:sp>
         </mc:Choice>
-        <mc:Fallback>
+        <mc:Fallback xmlns="">
           <p:sp>
             <p:nvSpPr>
               <p:cNvPr id="54" name="Rectangle 53"/>
@@ -8146,8 +8150,8 @@
           </a:fontRef>
         </p:style>
       </p:cxnSp>
-      <mc:AlternateContent xmlns:mc="http://schemas.openxmlformats.org/markup-compatibility/2006">
-        <mc:Choice xmlns:a14="http://schemas.microsoft.com/office/drawing/2010/main" Requires="a14">
+      <mc:AlternateContent xmlns:mc="http://schemas.openxmlformats.org/markup-compatibility/2006" xmlns:a14="http://schemas.microsoft.com/office/drawing/2010/main">
+        <mc:Choice Requires="a14">
           <p:sp>
             <p:nvSpPr>
               <p:cNvPr id="106" name="TextBox 105"/>
@@ -8223,7 +8227,7 @@
             </p:txBody>
           </p:sp>
         </mc:Choice>
-        <mc:Fallback>
+        <mc:Fallback xmlns="">
           <p:sp>
             <p:nvSpPr>
               <p:cNvPr id="106" name="TextBox 105"/>
@@ -8262,8 +8266,8 @@
           </p:sp>
         </mc:Fallback>
       </mc:AlternateContent>
-      <mc:AlternateContent xmlns:mc="http://schemas.openxmlformats.org/markup-compatibility/2006">
-        <mc:Choice xmlns:a14="http://schemas.microsoft.com/office/drawing/2010/main" Requires="a14">
+      <mc:AlternateContent xmlns:mc="http://schemas.openxmlformats.org/markup-compatibility/2006" xmlns:a14="http://schemas.microsoft.com/office/drawing/2010/main">
+        <mc:Choice Requires="a14">
           <p:sp>
             <p:nvSpPr>
               <p:cNvPr id="109" name="TextBox 108"/>
@@ -8347,7 +8351,7 @@
             </p:txBody>
           </p:sp>
         </mc:Choice>
-        <mc:Fallback>
+        <mc:Fallback xmlns="">
           <p:sp>
             <p:nvSpPr>
               <p:cNvPr id="109" name="TextBox 108"/>
@@ -8386,8 +8390,8 @@
           </p:sp>
         </mc:Fallback>
       </mc:AlternateContent>
-      <mc:AlternateContent xmlns:mc="http://schemas.openxmlformats.org/markup-compatibility/2006">
-        <mc:Choice xmlns:a14="http://schemas.microsoft.com/office/drawing/2010/main" Requires="a14">
+      <mc:AlternateContent xmlns:mc="http://schemas.openxmlformats.org/markup-compatibility/2006" xmlns:a14="http://schemas.microsoft.com/office/drawing/2010/main">
+        <mc:Choice Requires="a14">
           <p:sp>
             <p:nvSpPr>
               <p:cNvPr id="110" name="TextBox 109"/>
@@ -8438,7 +8442,7 @@
             </p:txBody>
           </p:sp>
         </mc:Choice>
-        <mc:Fallback>
+        <mc:Fallback xmlns="">
           <p:sp>
             <p:nvSpPr>
               <p:cNvPr id="110" name="TextBox 109"/>
@@ -8477,8 +8481,8 @@
           </p:sp>
         </mc:Fallback>
       </mc:AlternateContent>
-      <mc:AlternateContent xmlns:mc="http://schemas.openxmlformats.org/markup-compatibility/2006">
-        <mc:Choice xmlns:a14="http://schemas.microsoft.com/office/drawing/2010/main" Requires="a14">
+      <mc:AlternateContent xmlns:mc="http://schemas.openxmlformats.org/markup-compatibility/2006" xmlns:a14="http://schemas.microsoft.com/office/drawing/2010/main">
+        <mc:Choice Requires="a14">
           <p:sp>
             <p:nvSpPr>
               <p:cNvPr id="111" name="TextBox 110"/>
@@ -8554,7 +8558,7 @@
             </p:txBody>
           </p:sp>
         </mc:Choice>
-        <mc:Fallback>
+        <mc:Fallback xmlns="">
           <p:sp>
             <p:nvSpPr>
               <p:cNvPr id="111" name="TextBox 110"/>
@@ -8593,8 +8597,8 @@
           </p:sp>
         </mc:Fallback>
       </mc:AlternateContent>
-      <mc:AlternateContent xmlns:mc="http://schemas.openxmlformats.org/markup-compatibility/2006">
-        <mc:Choice xmlns:a14="http://schemas.microsoft.com/office/drawing/2010/main" Requires="a14">
+      <mc:AlternateContent xmlns:mc="http://schemas.openxmlformats.org/markup-compatibility/2006" xmlns:a14="http://schemas.microsoft.com/office/drawing/2010/main">
+        <mc:Choice Requires="a14">
           <p:sp>
             <p:nvSpPr>
               <p:cNvPr id="112" name="TextBox 111"/>
@@ -8670,7 +8674,7 @@
             </p:txBody>
           </p:sp>
         </mc:Choice>
-        <mc:Fallback>
+        <mc:Fallback xmlns="">
           <p:sp>
             <p:nvSpPr>
               <p:cNvPr id="112" name="TextBox 111"/>
@@ -9393,8 +9397,8 @@
           </a:p>
         </p:txBody>
       </p:sp>
-      <mc:AlternateContent xmlns:mc="http://schemas.openxmlformats.org/markup-compatibility/2006">
-        <mc:Choice xmlns:a14="http://schemas.microsoft.com/office/drawing/2010/main" Requires="a14">
+      <mc:AlternateContent xmlns:mc="http://schemas.openxmlformats.org/markup-compatibility/2006" xmlns:a14="http://schemas.microsoft.com/office/drawing/2010/main">
+        <mc:Choice Requires="a14">
           <p:sp>
             <p:nvSpPr>
               <p:cNvPr id="118" name="Rectangle 117"/>
@@ -9863,7 +9867,7 @@
                           <m:sSup>
                             <m:sSupPr>
                               <m:ctrlPr>
-                                <a:rPr lang="en-US" b="0" i="0" smtClean="0">
+                                <a:rPr lang="en-US" b="0" i="1" smtClean="0">
                                   <a:solidFill>
                                     <a:schemeClr val="tx1"/>
                                   </a:solidFill>
@@ -10078,7 +10082,7 @@
             </p:txBody>
           </p:sp>
         </mc:Choice>
-        <mc:Fallback>
+        <mc:Fallback xmlns="">
           <p:sp>
             <p:nvSpPr>
               <p:cNvPr id="118" name="Rectangle 117"/>
@@ -10121,6 +10125,746 @@
     <p:extLst>
       <p:ext uri="{BB962C8B-B14F-4D97-AF65-F5344CB8AC3E}">
         <p14:creationId xmlns:p14="http://schemas.microsoft.com/office/powerpoint/2010/main" val="950084815"/>
+      </p:ext>
+    </p:extLst>
+  </p:cSld>
+  <p:clrMapOvr>
+    <a:masterClrMapping/>
+  </p:clrMapOvr>
+</p:sld>
+</file>
+
+<file path=ppt/slides/slide2.xml><?xml version="1.0" encoding="utf-8"?>
+<p:sld xmlns:a="http://schemas.openxmlformats.org/drawingml/2006/main" xmlns:r="http://schemas.openxmlformats.org/officeDocument/2006/relationships" xmlns:p="http://schemas.openxmlformats.org/presentationml/2006/main">
+  <p:cSld>
+    <p:spTree>
+      <p:nvGrpSpPr>
+        <p:cNvPr id="1" name=""/>
+        <p:cNvGrpSpPr/>
+        <p:nvPr/>
+      </p:nvGrpSpPr>
+      <p:grpSpPr>
+        <a:xfrm>
+          <a:off x="0" y="0"/>
+          <a:ext cx="0" cy="0"/>
+          <a:chOff x="0" y="0"/>
+          <a:chExt cx="0" cy="0"/>
+        </a:xfrm>
+      </p:grpSpPr>
+      <p:sp>
+        <p:nvSpPr>
+          <p:cNvPr id="2" name="Title 1"/>
+          <p:cNvSpPr>
+            <a:spLocks noGrp="1"/>
+          </p:cNvSpPr>
+          <p:nvPr>
+            <p:ph type="title"/>
+          </p:nvPr>
+        </p:nvSpPr>
+        <p:spPr/>
+        <p:txBody>
+          <a:bodyPr/>
+          <a:lstStyle/>
+          <a:p>
+            <a:r>
+              <a:rPr lang="en-US" dirty="0" smtClean="0"/>
+              <a:t>Notes on Coordinate Systems*</a:t>
+            </a:r>
+            <a:endParaRPr lang="en-US" dirty="0"/>
+          </a:p>
+        </p:txBody>
+      </p:sp>
+      <p:sp>
+        <p:nvSpPr>
+          <p:cNvPr id="3" name="Content Placeholder 2"/>
+          <p:cNvSpPr>
+            <a:spLocks noGrp="1"/>
+          </p:cNvSpPr>
+          <p:nvPr>
+            <p:ph idx="1"/>
+          </p:nvPr>
+        </p:nvSpPr>
+        <p:spPr/>
+        <p:txBody>
+          <a:bodyPr/>
+          <a:lstStyle/>
+          <a:p>
+            <a:r>
+              <a:rPr lang="en-US" dirty="0" smtClean="0"/>
+              <a:t>Physical Cartesian coordinate system:</a:t>
+            </a:r>
+          </a:p>
+          <a:p>
+            <a:pPr lvl="1"/>
+            <a:r>
+              <a:rPr lang="en-US" dirty="0" smtClean="0"/>
+              <a:t>Consensus definitions:</a:t>
+            </a:r>
+          </a:p>
+          <a:p>
+            <a:pPr lvl="2"/>
+            <a:r>
+              <a:rPr lang="en-US" dirty="0" smtClean="0"/>
+              <a:t>O = mirror center / laser spot on mirror (equal?)</a:t>
+            </a:r>
+          </a:p>
+          <a:p>
+            <a:pPr lvl="2"/>
+            <a:r>
+              <a:rPr lang="en-US" dirty="0" smtClean="0"/>
+              <a:t>Z = boresight</a:t>
+            </a:r>
+          </a:p>
+          <a:p>
+            <a:pPr lvl="2"/>
+            <a:r>
+              <a:rPr lang="en-US" dirty="0" smtClean="0"/>
+              <a:t>Y = up</a:t>
+            </a:r>
+          </a:p>
+          <a:p>
+            <a:pPr lvl="1"/>
+            <a:r>
+              <a:rPr lang="en-US" dirty="0" smtClean="0"/>
+              <a:t>Fluid definition:</a:t>
+            </a:r>
+          </a:p>
+          <a:p>
+            <a:pPr lvl="2"/>
+            <a:r>
+              <a:rPr lang="en-US" dirty="0" smtClean="0"/>
+              <a:t>X = leftward (when looking with camera) – in accordance with right-hand rule convention</a:t>
+            </a:r>
+          </a:p>
+          <a:p>
+            <a:pPr lvl="2"/>
+            <a:r>
+              <a:rPr lang="en-US" dirty="0" smtClean="0"/>
+              <a:t>X = rightward (when looking with camera) – in accordance with conventional 2D-images coordinate systems (as in Slide 1)</a:t>
+            </a:r>
+          </a:p>
+        </p:txBody>
+      </p:sp>
+      <p:sp>
+        <p:nvSpPr>
+          <p:cNvPr id="4" name="TextBox 3"/>
+          <p:cNvSpPr txBox="1"/>
+          <p:nvPr/>
+        </p:nvSpPr>
+        <p:spPr>
+          <a:xfrm>
+            <a:off x="757881" y="6176963"/>
+            <a:ext cx="4917989" cy="369332"/>
+          </a:xfrm>
+          <a:prstGeom prst="rect">
+            <a:avLst/>
+          </a:prstGeom>
+          <a:noFill/>
+        </p:spPr>
+        <p:txBody>
+          <a:bodyPr wrap="square" rtlCol="0">
+            <a:spAutoFit/>
+          </a:bodyPr>
+          <a:lstStyle/>
+          <a:p>
+            <a:r>
+              <a:rPr lang="en-US" dirty="0" smtClean="0"/>
+              <a:t>* told by Tal 30/4/19, summarized by Steve 1/5/19</a:t>
+            </a:r>
+            <a:endParaRPr lang="en-US" dirty="0"/>
+          </a:p>
+        </p:txBody>
+      </p:sp>
+    </p:spTree>
+    <p:extLst>
+      <p:ext uri="{BB962C8B-B14F-4D97-AF65-F5344CB8AC3E}">
+        <p14:creationId xmlns:p14="http://schemas.microsoft.com/office/powerpoint/2010/main" val="1210531569"/>
+      </p:ext>
+    </p:extLst>
+  </p:cSld>
+  <p:clrMapOvr>
+    <a:masterClrMapping/>
+  </p:clrMapOvr>
+</p:sld>
+</file>
+
+<file path=ppt/slides/slide3.xml><?xml version="1.0" encoding="utf-8"?>
+<p:sld xmlns:a="http://schemas.openxmlformats.org/drawingml/2006/main" xmlns:r="http://schemas.openxmlformats.org/officeDocument/2006/relationships" xmlns:p="http://schemas.openxmlformats.org/presentationml/2006/main">
+  <p:cSld>
+    <p:spTree>
+      <p:nvGrpSpPr>
+        <p:cNvPr id="1" name=""/>
+        <p:cNvGrpSpPr/>
+        <p:nvPr/>
+      </p:nvGrpSpPr>
+      <p:grpSpPr>
+        <a:xfrm>
+          <a:off x="0" y="0"/>
+          <a:ext cx="0" cy="0"/>
+          <a:chOff x="0" y="0"/>
+          <a:chExt cx="0" cy="0"/>
+        </a:xfrm>
+      </p:grpSpPr>
+      <p:sp>
+        <p:nvSpPr>
+          <p:cNvPr id="2" name="Title 1"/>
+          <p:cNvSpPr>
+            <a:spLocks noGrp="1"/>
+          </p:cNvSpPr>
+          <p:nvPr>
+            <p:ph type="title"/>
+          </p:nvPr>
+        </p:nvSpPr>
+        <p:spPr/>
+        <p:txBody>
+          <a:bodyPr/>
+          <a:lstStyle/>
+          <a:p>
+            <a:r>
+              <a:rPr lang="en-US" dirty="0" smtClean="0"/>
+              <a:t>Notes on Coordinate Systems*</a:t>
+            </a:r>
+            <a:endParaRPr lang="en-US" dirty="0"/>
+          </a:p>
+        </p:txBody>
+      </p:sp>
+      <p:sp>
+        <p:nvSpPr>
+          <p:cNvPr id="3" name="Content Placeholder 2"/>
+          <p:cNvSpPr>
+            <a:spLocks noGrp="1"/>
+          </p:cNvSpPr>
+          <p:nvPr>
+            <p:ph idx="1"/>
+          </p:nvPr>
+        </p:nvSpPr>
+        <p:spPr/>
+        <p:txBody>
+          <a:bodyPr>
+            <a:normAutofit/>
+          </a:bodyPr>
+          <a:lstStyle/>
+          <a:p>
+            <a:r>
+              <a:rPr lang="en-US" dirty="0" smtClean="0"/>
+              <a:t>Mirror spherical coordinate system:</a:t>
+            </a:r>
+          </a:p>
+          <a:p>
+            <a:pPr lvl="1"/>
+            <a:r>
+              <a:rPr lang="en-US" dirty="0" smtClean="0"/>
+              <a:t>Let N be the normal to the mirror, facing outward</a:t>
+            </a:r>
+          </a:p>
+          <a:p>
+            <a:pPr lvl="1"/>
+            <a:r>
+              <a:rPr lang="en-US" dirty="0" err="1" smtClean="0"/>
+              <a:t>angX</a:t>
+            </a:r>
+            <a:r>
+              <a:rPr lang="en-US" dirty="0" smtClean="0"/>
+              <a:t> = angle between N</a:t>
+            </a:r>
+            <a:r>
+              <a:rPr lang="en-US" baseline="-25000" dirty="0" smtClean="0"/>
+              <a:t>Z</a:t>
+            </a:r>
+            <a:r>
+              <a:rPr lang="en-US" dirty="0" smtClean="0"/>
+              <a:t> and N</a:t>
+            </a:r>
+            <a:r>
+              <a:rPr lang="en-US" baseline="-25000" dirty="0" smtClean="0"/>
+              <a:t>X</a:t>
+            </a:r>
+            <a:r>
+              <a:rPr lang="en-US" dirty="0" smtClean="0"/>
+              <a:t> (measured from Z to X in X-Z plane)</a:t>
+            </a:r>
+          </a:p>
+          <a:p>
+            <a:pPr lvl="1"/>
+            <a:r>
+              <a:rPr lang="en-US" dirty="0" err="1" smtClean="0"/>
+              <a:t>angY</a:t>
+            </a:r>
+            <a:r>
+              <a:rPr lang="en-US" dirty="0" smtClean="0"/>
+              <a:t> = angle between </a:t>
+            </a:r>
+            <a:r>
+              <a:rPr lang="en-US" dirty="0" err="1" smtClean="0"/>
+              <a:t>N</a:t>
+            </a:r>
+            <a:r>
+              <a:rPr lang="en-US" baseline="-25000" dirty="0" err="1" smtClean="0"/>
+              <a:t>y</a:t>
+            </a:r>
+            <a:r>
+              <a:rPr lang="en-US" dirty="0" smtClean="0"/>
+              <a:t> and projection on X-Z plane (positive above plane)</a:t>
+            </a:r>
+          </a:p>
+          <a:p>
+            <a:pPr lvl="1"/>
+            <a:r>
+              <a:rPr lang="en-US" dirty="0" smtClean="0"/>
+              <a:t>PZR’s measurements are converted to </a:t>
+            </a:r>
+            <a:r>
+              <a:rPr lang="en-US" dirty="0" err="1" smtClean="0"/>
+              <a:t>angX,angY</a:t>
+            </a:r>
+            <a:r>
+              <a:rPr lang="en-US" dirty="0" smtClean="0"/>
+              <a:t> in MC</a:t>
+            </a:r>
+          </a:p>
+          <a:p>
+            <a:r>
+              <a:rPr lang="en-US" dirty="0" smtClean="0"/>
+              <a:t>Gen1 ES bug:</a:t>
+            </a:r>
+          </a:p>
+          <a:p>
+            <a:pPr lvl="1"/>
+            <a:r>
+              <a:rPr lang="en-US" dirty="0" smtClean="0"/>
+              <a:t>Mirror rotated by 180° in installation, such that laser scanning goes from right-to-left instead of left-to-right</a:t>
+            </a:r>
+          </a:p>
+          <a:p>
+            <a:pPr lvl="1"/>
+            <a:r>
+              <a:rPr lang="en-US" dirty="0" smtClean="0"/>
+              <a:t>Since </a:t>
+            </a:r>
+            <a:r>
+              <a:rPr lang="en-US" dirty="0" err="1" smtClean="0"/>
+              <a:t>Algo</a:t>
+            </a:r>
+            <a:r>
+              <a:rPr lang="en-US" dirty="0" smtClean="0"/>
+              <a:t> Pipe applies positive increments in X, output image is reversed (X = leftward, as in right-hand rule system) and requires back-reversion at the host</a:t>
+            </a:r>
+          </a:p>
+        </p:txBody>
+      </p:sp>
+      <p:sp>
+        <p:nvSpPr>
+          <p:cNvPr id="4" name="TextBox 3"/>
+          <p:cNvSpPr txBox="1"/>
+          <p:nvPr/>
+        </p:nvSpPr>
+        <p:spPr>
+          <a:xfrm>
+            <a:off x="757881" y="6176963"/>
+            <a:ext cx="4917989" cy="369332"/>
+          </a:xfrm>
+          <a:prstGeom prst="rect">
+            <a:avLst/>
+          </a:prstGeom>
+          <a:noFill/>
+        </p:spPr>
+        <p:txBody>
+          <a:bodyPr wrap="square" rtlCol="0">
+            <a:spAutoFit/>
+          </a:bodyPr>
+          <a:lstStyle/>
+          <a:p>
+            <a:r>
+              <a:rPr lang="en-US" dirty="0" smtClean="0"/>
+              <a:t>* told by Tal 30/4/19, summarized by Steve 1/5/19</a:t>
+            </a:r>
+            <a:endParaRPr lang="en-US" dirty="0"/>
+          </a:p>
+        </p:txBody>
+      </p:sp>
+    </p:spTree>
+    <p:extLst>
+      <p:ext uri="{BB962C8B-B14F-4D97-AF65-F5344CB8AC3E}">
+        <p14:creationId xmlns:p14="http://schemas.microsoft.com/office/powerpoint/2010/main" val="2447762280"/>
+      </p:ext>
+    </p:extLst>
+  </p:cSld>
+  <p:clrMapOvr>
+    <a:masterClrMapping/>
+  </p:clrMapOvr>
+</p:sld>
+</file>
+
+<file path=ppt/slides/slide4.xml><?xml version="1.0" encoding="utf-8"?>
+<p:sld xmlns:a="http://schemas.openxmlformats.org/drawingml/2006/main" xmlns:r="http://schemas.openxmlformats.org/officeDocument/2006/relationships" xmlns:p="http://schemas.openxmlformats.org/presentationml/2006/main">
+  <p:cSld>
+    <p:spTree>
+      <p:nvGrpSpPr>
+        <p:cNvPr id="1" name=""/>
+        <p:cNvGrpSpPr/>
+        <p:nvPr/>
+      </p:nvGrpSpPr>
+      <p:grpSpPr>
+        <a:xfrm>
+          <a:off x="0" y="0"/>
+          <a:ext cx="0" cy="0"/>
+          <a:chOff x="0" y="0"/>
+          <a:chExt cx="0" cy="0"/>
+        </a:xfrm>
+      </p:grpSpPr>
+      <p:sp>
+        <p:nvSpPr>
+          <p:cNvPr id="2" name="Title 1"/>
+          <p:cNvSpPr>
+            <a:spLocks noGrp="1"/>
+          </p:cNvSpPr>
+          <p:nvPr>
+            <p:ph type="title"/>
+          </p:nvPr>
+        </p:nvSpPr>
+        <p:spPr/>
+        <p:txBody>
+          <a:bodyPr/>
+          <a:lstStyle/>
+          <a:p>
+            <a:r>
+              <a:rPr lang="en-US" dirty="0" smtClean="0"/>
+              <a:t>Notes on Coordinate Systems*</a:t>
+            </a:r>
+            <a:endParaRPr lang="en-US" dirty="0"/>
+          </a:p>
+        </p:txBody>
+      </p:sp>
+      <p:sp>
+        <p:nvSpPr>
+          <p:cNvPr id="3" name="Content Placeholder 2"/>
+          <p:cNvSpPr>
+            <a:spLocks noGrp="1"/>
+          </p:cNvSpPr>
+          <p:nvPr>
+            <p:ph idx="1"/>
+          </p:nvPr>
+        </p:nvSpPr>
+        <p:spPr/>
+        <p:txBody>
+          <a:bodyPr>
+            <a:normAutofit/>
+          </a:bodyPr>
+          <a:lstStyle/>
+          <a:p>
+            <a:r>
+              <a:rPr lang="en-US" dirty="0" smtClean="0"/>
+              <a:t>Image “pyramidal” coordinate system:</a:t>
+            </a:r>
+          </a:p>
+          <a:p>
+            <a:pPr lvl="1"/>
+            <a:r>
+              <a:rPr lang="en-US" dirty="0" smtClean="0"/>
+              <a:t>Let B the boresight direction</a:t>
+            </a:r>
+          </a:p>
+          <a:p>
+            <a:pPr lvl="1"/>
+            <a:r>
+              <a:rPr lang="el-GR" dirty="0" smtClean="0"/>
+              <a:t>θ</a:t>
+            </a:r>
+            <a:r>
+              <a:rPr lang="en-US" baseline="-25000" dirty="0" smtClean="0"/>
+              <a:t>y</a:t>
+            </a:r>
+            <a:r>
+              <a:rPr lang="en-US" dirty="0" smtClean="0"/>
+              <a:t> = angle between B</a:t>
+            </a:r>
+            <a:r>
+              <a:rPr lang="en-US" baseline="-25000" dirty="0" smtClean="0"/>
+              <a:t>Z</a:t>
+            </a:r>
+            <a:r>
+              <a:rPr lang="en-US" dirty="0" smtClean="0"/>
+              <a:t> and projection on Y-Z plane (positive above plane)</a:t>
+            </a:r>
+          </a:p>
+          <a:p>
+            <a:pPr lvl="1"/>
+            <a:r>
+              <a:rPr lang="el-GR" dirty="0" smtClean="0"/>
+              <a:t>θ</a:t>
+            </a:r>
+            <a:r>
+              <a:rPr lang="en-US" baseline="-25000" dirty="0" smtClean="0"/>
+              <a:t>x</a:t>
+            </a:r>
+            <a:r>
+              <a:rPr lang="en-US" dirty="0" smtClean="0"/>
+              <a:t> </a:t>
+            </a:r>
+            <a:r>
+              <a:rPr lang="en-US" dirty="0"/>
+              <a:t>= angle between B</a:t>
+            </a:r>
+            <a:r>
+              <a:rPr lang="en-US" baseline="-25000" dirty="0"/>
+              <a:t>Z</a:t>
+            </a:r>
+            <a:r>
+              <a:rPr lang="en-US" dirty="0"/>
+              <a:t> and projection on </a:t>
+            </a:r>
+            <a:r>
+              <a:rPr lang="en-US" dirty="0" smtClean="0"/>
+              <a:t>X-Z </a:t>
+            </a:r>
+            <a:r>
+              <a:rPr lang="en-US" dirty="0"/>
+              <a:t>plane </a:t>
+            </a:r>
+            <a:r>
+              <a:rPr lang="en-US" dirty="0" smtClean="0"/>
+              <a:t>(measured from Z to X)</a:t>
+            </a:r>
+          </a:p>
+          <a:p>
+            <a:pPr lvl="1"/>
+            <a:r>
+              <a:rPr lang="en-US" dirty="0" smtClean="0"/>
+              <a:t>For constant depth:</a:t>
+            </a:r>
+          </a:p>
+          <a:p>
+            <a:pPr lvl="2"/>
+            <a:r>
+              <a:rPr lang="en-US" dirty="0"/>
+              <a:t>Y is constant within row</a:t>
+            </a:r>
+          </a:p>
+          <a:p>
+            <a:pPr lvl="2"/>
+            <a:r>
+              <a:rPr lang="en-US" dirty="0" smtClean="0"/>
+              <a:t>X is constant within column</a:t>
+            </a:r>
+          </a:p>
+          <a:p>
+            <a:pPr lvl="2"/>
+            <a:r>
+              <a:rPr lang="en-US" dirty="0" smtClean="0"/>
+              <a:t>Observed plane together with receiver form a pyramid</a:t>
+            </a:r>
+          </a:p>
+          <a:p>
+            <a:pPr lvl="1"/>
+            <a:r>
+              <a:rPr lang="en-US" dirty="0" smtClean="0"/>
+              <a:t>In general:</a:t>
+            </a:r>
+          </a:p>
+          <a:p>
+            <a:pPr lvl="2"/>
+            <a:r>
+              <a:rPr lang="el-GR" dirty="0"/>
+              <a:t>θ</a:t>
+            </a:r>
+            <a:r>
+              <a:rPr lang="en-US" baseline="-25000" dirty="0"/>
+              <a:t>y</a:t>
+            </a:r>
+            <a:r>
+              <a:rPr lang="en-US" dirty="0" smtClean="0"/>
+              <a:t> = constant within row</a:t>
+            </a:r>
+          </a:p>
+          <a:p>
+            <a:pPr lvl="2"/>
+            <a:r>
+              <a:rPr lang="el-GR" dirty="0" smtClean="0"/>
+              <a:t>θ</a:t>
+            </a:r>
+            <a:r>
+              <a:rPr lang="en-US" baseline="-25000" dirty="0" smtClean="0"/>
+              <a:t>x</a:t>
+            </a:r>
+            <a:r>
+              <a:rPr lang="en-US" dirty="0" smtClean="0"/>
+              <a:t> </a:t>
+            </a:r>
+            <a:r>
+              <a:rPr lang="en-US" dirty="0"/>
+              <a:t>= constant within </a:t>
+            </a:r>
+            <a:r>
+              <a:rPr lang="en-US" dirty="0" smtClean="0"/>
+              <a:t>column</a:t>
+            </a:r>
+          </a:p>
+        </p:txBody>
+      </p:sp>
+      <p:sp>
+        <p:nvSpPr>
+          <p:cNvPr id="4" name="TextBox 3"/>
+          <p:cNvSpPr txBox="1"/>
+          <p:nvPr/>
+        </p:nvSpPr>
+        <p:spPr>
+          <a:xfrm>
+            <a:off x="757881" y="6176963"/>
+            <a:ext cx="4917989" cy="369332"/>
+          </a:xfrm>
+          <a:prstGeom prst="rect">
+            <a:avLst/>
+          </a:prstGeom>
+          <a:noFill/>
+        </p:spPr>
+        <p:txBody>
+          <a:bodyPr wrap="square" rtlCol="0">
+            <a:spAutoFit/>
+          </a:bodyPr>
+          <a:lstStyle/>
+          <a:p>
+            <a:r>
+              <a:rPr lang="en-US" dirty="0" smtClean="0"/>
+              <a:t>* told by Tal 30/4/19, summarized by Steve 1/5/19</a:t>
+            </a:r>
+            <a:endParaRPr lang="en-US" dirty="0"/>
+          </a:p>
+        </p:txBody>
+      </p:sp>
+    </p:spTree>
+    <p:extLst>
+      <p:ext uri="{BB962C8B-B14F-4D97-AF65-F5344CB8AC3E}">
+        <p14:creationId xmlns:p14="http://schemas.microsoft.com/office/powerpoint/2010/main" val="138637826"/>
+      </p:ext>
+    </p:extLst>
+  </p:cSld>
+  <p:clrMapOvr>
+    <a:masterClrMapping/>
+  </p:clrMapOvr>
+</p:sld>
+</file>
+
+<file path=ppt/slides/slide5.xml><?xml version="1.0" encoding="utf-8"?>
+<p:sld xmlns:a="http://schemas.openxmlformats.org/drawingml/2006/main" xmlns:r="http://schemas.openxmlformats.org/officeDocument/2006/relationships" xmlns:p="http://schemas.openxmlformats.org/presentationml/2006/main">
+  <p:cSld>
+    <p:spTree>
+      <p:nvGrpSpPr>
+        <p:cNvPr id="1" name=""/>
+        <p:cNvGrpSpPr/>
+        <p:nvPr/>
+      </p:nvGrpSpPr>
+      <p:grpSpPr>
+        <a:xfrm>
+          <a:off x="0" y="0"/>
+          <a:ext cx="0" cy="0"/>
+          <a:chOff x="0" y="0"/>
+          <a:chExt cx="0" cy="0"/>
+        </a:xfrm>
+      </p:grpSpPr>
+      <p:sp>
+        <p:nvSpPr>
+          <p:cNvPr id="2" name="Title 1"/>
+          <p:cNvSpPr>
+            <a:spLocks noGrp="1"/>
+          </p:cNvSpPr>
+          <p:nvPr>
+            <p:ph type="title"/>
+          </p:nvPr>
+        </p:nvSpPr>
+        <p:spPr/>
+        <p:txBody>
+          <a:bodyPr/>
+          <a:lstStyle/>
+          <a:p>
+            <a:r>
+              <a:rPr lang="en-US" dirty="0" smtClean="0"/>
+              <a:t>Notes on Coordinate Systems*</a:t>
+            </a:r>
+            <a:endParaRPr lang="en-US" dirty="0"/>
+          </a:p>
+        </p:txBody>
+      </p:sp>
+      <p:sp>
+        <p:nvSpPr>
+          <p:cNvPr id="3" name="Content Placeholder 2"/>
+          <p:cNvSpPr>
+            <a:spLocks noGrp="1"/>
+          </p:cNvSpPr>
+          <p:nvPr>
+            <p:ph idx="1"/>
+          </p:nvPr>
+        </p:nvSpPr>
+        <p:spPr/>
+        <p:txBody>
+          <a:bodyPr>
+            <a:normAutofit/>
+          </a:bodyPr>
+          <a:lstStyle/>
+          <a:p>
+            <a:r>
+              <a:rPr lang="en-US" dirty="0" smtClean="0"/>
+              <a:t>Pixel generation</a:t>
+            </a:r>
+          </a:p>
+          <a:p>
+            <a:pPr lvl="1"/>
+            <a:r>
+              <a:rPr lang="en-US" dirty="0" smtClean="0"/>
+              <a:t>Laser is sensed by APD, but the image (based on ray directions) is attributed to the mirror</a:t>
+            </a:r>
+          </a:p>
+          <a:p>
+            <a:pPr lvl="1"/>
+            <a:r>
+              <a:rPr lang="en-US" dirty="0" smtClean="0"/>
+              <a:t>Laser outward direction depends on the mirror’s normal and on inward direction (direction </a:t>
+            </a:r>
+            <a:r>
+              <a:rPr lang="en-US" dirty="0"/>
+              <a:t>of intercepting the mirror – estimated in calibration process</a:t>
+            </a:r>
+            <a:r>
+              <a:rPr lang="en-US" dirty="0" smtClean="0"/>
+              <a:t>)</a:t>
+            </a:r>
+            <a:endParaRPr lang="en-US" dirty="0"/>
+          </a:p>
+        </p:txBody>
+      </p:sp>
+      <p:sp>
+        <p:nvSpPr>
+          <p:cNvPr id="4" name="TextBox 3"/>
+          <p:cNvSpPr txBox="1"/>
+          <p:nvPr/>
+        </p:nvSpPr>
+        <p:spPr>
+          <a:xfrm>
+            <a:off x="757881" y="6176963"/>
+            <a:ext cx="4917989" cy="369332"/>
+          </a:xfrm>
+          <a:prstGeom prst="rect">
+            <a:avLst/>
+          </a:prstGeom>
+          <a:noFill/>
+        </p:spPr>
+        <p:txBody>
+          <a:bodyPr wrap="square" rtlCol="0">
+            <a:spAutoFit/>
+          </a:bodyPr>
+          <a:lstStyle/>
+          <a:p>
+            <a:r>
+              <a:rPr lang="en-US" dirty="0" smtClean="0"/>
+              <a:t>* told by Tal 30/4/19, summarized by Steve 1/5/19</a:t>
+            </a:r>
+            <a:endParaRPr lang="en-US" dirty="0"/>
+          </a:p>
+        </p:txBody>
+      </p:sp>
+    </p:spTree>
+    <p:extLst>
+      <p:ext uri="{BB962C8B-B14F-4D97-AF65-F5344CB8AC3E}">
+        <p14:creationId xmlns:p14="http://schemas.microsoft.com/office/powerpoint/2010/main" val="2622832285"/>
       </p:ext>
     </p:extLst>
   </p:cSld>

</xml_diff>

<commit_message>
Further clarifications in DESTangles.pptx
</commit_message>
<xml_diff>
--- a/docs/misc/DESTangles.pptx
+++ b/docs/misc/DESTangles.pptx
@@ -10,6 +10,7 @@
     <p:sldId id="258" r:id="rId4"/>
     <p:sldId id="259" r:id="rId5"/>
     <p:sldId id="261" r:id="rId6"/>
+    <p:sldId id="262" r:id="rId7"/>
   </p:sldIdLst>
   <p:sldSz cx="12192000" cy="6858000"/>
   <p:notesSz cx="6858000" cy="9144000"/>
@@ -247,7 +248,7 @@
           <a:p>
             <a:fld id="{EFE5E818-53A5-4017-9DB5-8CFA9A1E4433}" type="datetimeFigureOut">
               <a:rPr lang="en-US" smtClean="0"/>
-              <a:t>5/1/2019</a:t>
+              <a:t>5/7/2019</a:t>
             </a:fld>
             <a:endParaRPr lang="en-US"/>
           </a:p>
@@ -417,7 +418,7 @@
           <a:p>
             <a:fld id="{EFE5E818-53A5-4017-9DB5-8CFA9A1E4433}" type="datetimeFigureOut">
               <a:rPr lang="en-US" smtClean="0"/>
-              <a:t>5/1/2019</a:t>
+              <a:t>5/7/2019</a:t>
             </a:fld>
             <a:endParaRPr lang="en-US"/>
           </a:p>
@@ -597,7 +598,7 @@
           <a:p>
             <a:fld id="{EFE5E818-53A5-4017-9DB5-8CFA9A1E4433}" type="datetimeFigureOut">
               <a:rPr lang="en-US" smtClean="0"/>
-              <a:t>5/1/2019</a:t>
+              <a:t>5/7/2019</a:t>
             </a:fld>
             <a:endParaRPr lang="en-US"/>
           </a:p>
@@ -767,7 +768,7 @@
           <a:p>
             <a:fld id="{EFE5E818-53A5-4017-9DB5-8CFA9A1E4433}" type="datetimeFigureOut">
               <a:rPr lang="en-US" smtClean="0"/>
-              <a:t>5/1/2019</a:t>
+              <a:t>5/7/2019</a:t>
             </a:fld>
             <a:endParaRPr lang="en-US"/>
           </a:p>
@@ -1013,7 +1014,7 @@
           <a:p>
             <a:fld id="{EFE5E818-53A5-4017-9DB5-8CFA9A1E4433}" type="datetimeFigureOut">
               <a:rPr lang="en-US" smtClean="0"/>
-              <a:t>5/1/2019</a:t>
+              <a:t>5/7/2019</a:t>
             </a:fld>
             <a:endParaRPr lang="en-US"/>
           </a:p>
@@ -1245,7 +1246,7 @@
           <a:p>
             <a:fld id="{EFE5E818-53A5-4017-9DB5-8CFA9A1E4433}" type="datetimeFigureOut">
               <a:rPr lang="en-US" smtClean="0"/>
-              <a:t>5/1/2019</a:t>
+              <a:t>5/7/2019</a:t>
             </a:fld>
             <a:endParaRPr lang="en-US"/>
           </a:p>
@@ -1612,7 +1613,7 @@
           <a:p>
             <a:fld id="{EFE5E818-53A5-4017-9DB5-8CFA9A1E4433}" type="datetimeFigureOut">
               <a:rPr lang="en-US" smtClean="0"/>
-              <a:t>5/1/2019</a:t>
+              <a:t>5/7/2019</a:t>
             </a:fld>
             <a:endParaRPr lang="en-US"/>
           </a:p>
@@ -1730,7 +1731,7 @@
           <a:p>
             <a:fld id="{EFE5E818-53A5-4017-9DB5-8CFA9A1E4433}" type="datetimeFigureOut">
               <a:rPr lang="en-US" smtClean="0"/>
-              <a:t>5/1/2019</a:t>
+              <a:t>5/7/2019</a:t>
             </a:fld>
             <a:endParaRPr lang="en-US"/>
           </a:p>
@@ -1825,7 +1826,7 @@
           <a:p>
             <a:fld id="{EFE5E818-53A5-4017-9DB5-8CFA9A1E4433}" type="datetimeFigureOut">
               <a:rPr lang="en-US" smtClean="0"/>
-              <a:t>5/1/2019</a:t>
+              <a:t>5/7/2019</a:t>
             </a:fld>
             <a:endParaRPr lang="en-US"/>
           </a:p>
@@ -2102,7 +2103,7 @@
           <a:p>
             <a:fld id="{EFE5E818-53A5-4017-9DB5-8CFA9A1E4433}" type="datetimeFigureOut">
               <a:rPr lang="en-US" smtClean="0"/>
-              <a:t>5/1/2019</a:t>
+              <a:t>5/7/2019</a:t>
             </a:fld>
             <a:endParaRPr lang="en-US"/>
           </a:p>
@@ -2355,7 +2356,7 @@
           <a:p>
             <a:fld id="{EFE5E818-53A5-4017-9DB5-8CFA9A1E4433}" type="datetimeFigureOut">
               <a:rPr lang="en-US" smtClean="0"/>
-              <a:t>5/1/2019</a:t>
+              <a:t>5/7/2019</a:t>
             </a:fld>
             <a:endParaRPr lang="en-US"/>
           </a:p>
@@ -2568,7 +2569,7 @@
           <a:p>
             <a:fld id="{EFE5E818-53A5-4017-9DB5-8CFA9A1E4433}" type="datetimeFigureOut">
               <a:rPr lang="en-US" smtClean="0"/>
-              <a:t>5/1/2019</a:t>
+              <a:t>5/7/2019</a:t>
             </a:fld>
             <a:endParaRPr lang="en-US"/>
           </a:p>
@@ -10191,7 +10192,19 @@
           <a:p>
             <a:r>
               <a:rPr lang="en-US" dirty="0" smtClean="0"/>
-              <a:t>Physical Cartesian coordinate system:</a:t>
+              <a:t>Mirro</a:t>
+            </a:r>
+            <a:r>
+              <a:rPr lang="en-US" dirty="0" smtClean="0"/>
+              <a:t>r </a:t>
+            </a:r>
+            <a:r>
+              <a:rPr lang="en-US" dirty="0" smtClean="0"/>
+              <a:t>Cartesian </a:t>
+            </a:r>
+            <a:r>
+              <a:rPr lang="en-US" dirty="0" smtClean="0"/>
+              <a:t>coordinate system:</a:t>
             </a:r>
           </a:p>
           <a:p>
@@ -10865,6 +10878,155 @@
     <p:extLst>
       <p:ext uri="{BB962C8B-B14F-4D97-AF65-F5344CB8AC3E}">
         <p14:creationId xmlns:p14="http://schemas.microsoft.com/office/powerpoint/2010/main" val="2622832285"/>
+      </p:ext>
+    </p:extLst>
+  </p:cSld>
+  <p:clrMapOvr>
+    <a:masterClrMapping/>
+  </p:clrMapOvr>
+</p:sld>
+</file>
+
+<file path=ppt/slides/slide6.xml><?xml version="1.0" encoding="utf-8"?>
+<p:sld xmlns:a="http://schemas.openxmlformats.org/drawingml/2006/main" xmlns:r="http://schemas.openxmlformats.org/officeDocument/2006/relationships" xmlns:p="http://schemas.openxmlformats.org/presentationml/2006/main">
+  <p:cSld>
+    <p:spTree>
+      <p:nvGrpSpPr>
+        <p:cNvPr id="1" name=""/>
+        <p:cNvGrpSpPr/>
+        <p:nvPr/>
+      </p:nvGrpSpPr>
+      <p:grpSpPr>
+        <a:xfrm>
+          <a:off x="0" y="0"/>
+          <a:ext cx="0" cy="0"/>
+          <a:chOff x="0" y="0"/>
+          <a:chExt cx="0" cy="0"/>
+        </a:xfrm>
+      </p:grpSpPr>
+      <p:sp>
+        <p:nvSpPr>
+          <p:cNvPr id="2" name="Title 1"/>
+          <p:cNvSpPr>
+            <a:spLocks noGrp="1"/>
+          </p:cNvSpPr>
+          <p:nvPr>
+            <p:ph type="title"/>
+          </p:nvPr>
+        </p:nvSpPr>
+        <p:spPr/>
+        <p:txBody>
+          <a:bodyPr/>
+          <a:lstStyle/>
+          <a:p>
+            <a:r>
+              <a:rPr lang="en-US" dirty="0" smtClean="0"/>
+              <a:t>Notes on Coordinate Systems*</a:t>
+            </a:r>
+            <a:endParaRPr lang="en-US" dirty="0"/>
+          </a:p>
+        </p:txBody>
+      </p:sp>
+      <p:sp>
+        <p:nvSpPr>
+          <p:cNvPr id="3" name="Content Placeholder 2"/>
+          <p:cNvSpPr>
+            <a:spLocks noGrp="1"/>
+          </p:cNvSpPr>
+          <p:nvPr>
+            <p:ph idx="1"/>
+          </p:nvPr>
+        </p:nvSpPr>
+        <p:spPr/>
+        <p:txBody>
+          <a:bodyPr>
+            <a:normAutofit/>
+          </a:bodyPr>
+          <a:lstStyle/>
+          <a:p>
+            <a:r>
+              <a:rPr lang="en-US" dirty="0" smtClean="0"/>
+              <a:t>Interface with enclosure</a:t>
+            </a:r>
+            <a:endParaRPr lang="en-US" dirty="0" smtClean="0"/>
+          </a:p>
+          <a:p>
+            <a:pPr lvl="1"/>
+            <a:r>
+              <a:rPr lang="en-US" dirty="0" smtClean="0"/>
+              <a:t>All mathematics &amp; calibrations relate to the mirror’s coordinate system (MCS)</a:t>
+            </a:r>
+          </a:p>
+          <a:p>
+            <a:pPr lvl="1"/>
+            <a:r>
+              <a:rPr lang="en-US" dirty="0" smtClean="0"/>
+              <a:t>In principle, MCS may be assumed to coincide with the enclosure’s coordinate system (ECS), up to a translation.</a:t>
+            </a:r>
+          </a:p>
+          <a:p>
+            <a:pPr lvl="1"/>
+            <a:r>
+              <a:rPr lang="en-US" dirty="0" smtClean="0"/>
+              <a:t>In practice, possible rotations between MCS and ECS are not calibrated, hence MCS-ECS direction errors remain those of mirror installation w.r.t the enclosure</a:t>
+            </a:r>
+          </a:p>
+          <a:p>
+            <a:pPr lvl="1"/>
+            <a:r>
+              <a:rPr lang="en-US" dirty="0" smtClean="0"/>
+              <a:t>Currently, MCS-ECS direction errors are not a measure of interest in IVCAM</a:t>
+            </a:r>
+            <a:endParaRPr lang="en-US" dirty="0" smtClean="0"/>
+          </a:p>
+        </p:txBody>
+      </p:sp>
+      <p:sp>
+        <p:nvSpPr>
+          <p:cNvPr id="4" name="TextBox 3"/>
+          <p:cNvSpPr txBox="1"/>
+          <p:nvPr/>
+        </p:nvSpPr>
+        <p:spPr>
+          <a:xfrm>
+            <a:off x="757881" y="6176963"/>
+            <a:ext cx="4917989" cy="369332"/>
+          </a:xfrm>
+          <a:prstGeom prst="rect">
+            <a:avLst/>
+          </a:prstGeom>
+          <a:noFill/>
+        </p:spPr>
+        <p:txBody>
+          <a:bodyPr wrap="square" rtlCol="0">
+            <a:spAutoFit/>
+          </a:bodyPr>
+          <a:lstStyle/>
+          <a:p>
+            <a:r>
+              <a:rPr lang="en-US" dirty="0" smtClean="0"/>
+              <a:t>* told by Tal </a:t>
+            </a:r>
+            <a:r>
+              <a:rPr lang="en-US" dirty="0" smtClean="0"/>
+              <a:t>7/5/19</a:t>
+            </a:r>
+            <a:r>
+              <a:rPr lang="en-US" dirty="0" smtClean="0"/>
+              <a:t>, summarized by Steve </a:t>
+            </a:r>
+            <a:r>
+              <a:rPr lang="en-US" dirty="0" smtClean="0"/>
+              <a:t>7/5/19</a:t>
+            </a:r>
+            <a:endParaRPr lang="en-US" dirty="0"/>
+          </a:p>
+        </p:txBody>
+      </p:sp>
+    </p:spTree>
+    <p:extLst>
+      <p:ext uri="{BB962C8B-B14F-4D97-AF65-F5344CB8AC3E}">
+        <p14:creationId xmlns:p14="http://schemas.microsoft.com/office/powerpoint/2010/main" val="751282818"/>
       </p:ext>
     </p:extLst>
   </p:cSld>

</xml_diff>